<commit_message>
Update website hosting to VMs in Azure
</commit_message>
<xml_diff>
--- a/Whiteboard design session/WDS trainer presentation - Containers and DevOps.pptx
+++ b/Whiteboard design session/WDS trainer presentation - Containers and DevOps.pptx
@@ -221,7 +221,7 @@
           <a:p>
             <a:fld id="{52A13B17-C506-4D51-BB37-16B365906619}" type="datetimeFigureOut">
               <a:rPr lang="en-US" smtClean="0"/>
-              <a:t>10/21/2018</a:t>
+              <a:t>4/2/2019</a:t>
             </a:fld>
             <a:endParaRPr lang="en-US"/>
           </a:p>
@@ -2177,7 +2177,7 @@
                   <a:prstClr val="black"/>
                 </a:solidFill>
               </a:rPr>
-              <a:t>10/21/2018 12:50 PM</a:t>
+              <a:t>4/2/2019 4:32 PM</a:t>
             </a:fld>
             <a:endParaRPr lang="en-US" dirty="0">
               <a:solidFill>
@@ -18929,7 +18929,7 @@
             <a:pPr lvl="1" fontAlgn="base"/>
             <a:r>
               <a:rPr lang="en-US" sz="2800" b="1" dirty="0"/>
-              <a:t>Web applications and APIs hosted in Azure App Services</a:t>
+              <a:t>Web applications and APIs hosted on VMs in Azure</a:t>
             </a:r>
           </a:p>
           <a:p>
@@ -19086,7 +19086,7 @@
             <a:pPr lvl="2" fontAlgn="base"/>
             <a:r>
               <a:rPr lang="en-US" sz="2400" b="1" dirty="0"/>
-              <a:t>The tenant’s code is deployed to the App Service Plan (VM)</a:t>
+              <a:t>The tenant’s code is deployed to a VM in Azure</a:t>
             </a:r>
           </a:p>
           <a:p>

</xml_diff>